<commit_message>
created archive section and made single slide set
</commit_message>
<xml_diff>
--- a/VideoSessionsMaterials/server-side.pptx
+++ b/VideoSessionsMaterials/server-side.pptx
@@ -226,7 +226,7 @@
             <a:fld id="{DDC063FE-8627-9A42-970F-0BBEEB02B587}" type="datetimeFigureOut">
               <a:rPr lang="en-US" smtClean="0"/>
               <a:pPr/>
-              <a:t>12/9/13</a:t>
+              <a:t>12/17/13</a:t>
             </a:fld>
             <a:endParaRPr lang="en-US" dirty="0"/>
           </a:p>
@@ -5452,8 +5452,16 @@
           <a:lstStyle/>
           <a:p>
             <a:r>
+              <a:rPr lang="en-US" smtClean="0"/>
+              <a:t>Demo </a:t>
+            </a:r>
+            <a:r>
+              <a:rPr lang="en-US" smtClean="0"/>
+              <a:t>10: </a:t>
+            </a:r>
+            <a:r>
               <a:rPr lang="en-US" dirty="0" smtClean="0"/>
-              <a:t>Demo 8: Making Server-Side Requests</a:t>
+              <a:t>Making Server-Side Requests</a:t>
             </a:r>
           </a:p>
         </p:txBody>

</xml_diff>